<commit_message>
Live Demo Prep - Fixes
</commit_message>
<xml_diff>
--- a/Getting_Started_With_Blogging/gettintg-started-with-blogging-slide-deck-v1-0.pptx
+++ b/Getting_Started_With_Blogging/gettintg-started-with-blogging-slide-deck-v1-0.pptx
@@ -216,7 +216,7 @@
           <a:p>
             <a:fld id="{A0024FC8-169A-41DA-B22B-8D47ACEADE95}" type="datetimeFigureOut">
               <a:rPr lang="en-GB" smtClean="0"/>
-              <a:t>14/11/2023</a:t>
+              <a:t>27/11/2023</a:t>
             </a:fld>
             <a:endParaRPr lang="en-GB"/>
           </a:p>
@@ -528,6 +528,37 @@
           <a:bodyPr/>
           <a:lstStyle/>
           <a:p>
+            <a:pPr marL="0" marR="0" lvl="0" indent="0" algn="l" defTabSz="914400" rtl="0" eaLnBrk="1" fontAlgn="auto" latinLnBrk="0" hangingPunct="1">
+              <a:lnSpc>
+                <a:spcPct val="100000"/>
+              </a:lnSpc>
+              <a:spcBef>
+                <a:spcPts val="0"/>
+              </a:spcBef>
+              <a:spcAft>
+                <a:spcPts val="0"/>
+              </a:spcAft>
+              <a:buClrTx/>
+              <a:buSzTx/>
+              <a:buFontTx/>
+              <a:buNone/>
+              <a:tabLst/>
+              <a:defRPr/>
+            </a:pPr>
+            <a:r>
+              <a:rPr lang="en-GB" sz="1200" kern="1200" dirty="0">
+                <a:solidFill>
+                  <a:schemeClr val="tx1"/>
+                </a:solidFill>
+                <a:latin typeface="+mn-lt"/>
+                <a:ea typeface="+mn-ea"/>
+                <a:cs typeface="+mn-cs"/>
+              </a:rPr>
+              <a:t>Due to Azure Issues – this is frozen :D – Welcome to 2024 -&gt; https://blog.builtwithcaffeine.cloud</a:t>
+            </a:r>
+            <a:endParaRPr lang="en-GB" dirty="0"/>
+          </a:p>
+          <a:p>
             <a:endParaRPr lang="en-GB" dirty="0"/>
           </a:p>
         </p:txBody>
@@ -549,7 +580,7 @@
           <a:p>
             <a:fld id="{31697867-9353-408E-88A3-61A37A09B962}" type="slidenum">
               <a:rPr lang="en-GB" smtClean="0"/>
-              <a:t>8</a:t>
+              <a:t>2</a:t>
             </a:fld>
             <a:endParaRPr lang="en-GB"/>
           </a:p>
@@ -558,7 +589,7 @@
     </p:spTree>
     <p:extLst>
       <p:ext uri="{BB962C8B-B14F-4D97-AF65-F5344CB8AC3E}">
-        <p14:creationId xmlns:p14="http://schemas.microsoft.com/office/powerpoint/2010/main" val="3923540713"/>
+        <p14:creationId xmlns:p14="http://schemas.microsoft.com/office/powerpoint/2010/main" val="1600803237"/>
       </p:ext>
     </p:extLst>
   </p:cSld>
@@ -614,7 +645,784 @@
           <a:p>
             <a:r>
               <a:rPr lang="en-GB" dirty="0"/>
-              <a:t>Creating GitHub Repo</a:t>
+              <a:t>WordPress comes in two flavours Hosted and Self Hosted. </a:t>
+            </a:r>
+          </a:p>
+          <a:p>
+            <a:endParaRPr lang="en-GB" dirty="0"/>
+          </a:p>
+          <a:p>
+            <a:pPr marL="0" marR="0" lvl="0" indent="0" algn="l" defTabSz="914400" rtl="0" eaLnBrk="1" fontAlgn="auto" latinLnBrk="0" hangingPunct="1">
+              <a:lnSpc>
+                <a:spcPct val="100000"/>
+              </a:lnSpc>
+              <a:spcBef>
+                <a:spcPts val="0"/>
+              </a:spcBef>
+              <a:spcAft>
+                <a:spcPts val="0"/>
+              </a:spcAft>
+              <a:buClrTx/>
+              <a:buSzTx/>
+              <a:buFontTx/>
+              <a:buNone/>
+              <a:tabLst/>
+              <a:defRPr/>
+            </a:pPr>
+            <a:endParaRPr lang="en-GB" dirty="0">
+              <a:hlinkClick r:id="rId3">
+                <a:extLst>
+                  <a:ext uri="{A12FA001-AC4F-418D-AE19-62706E023703}">
+                    <ahyp:hlinkClr xmlns:ahyp="http://schemas.microsoft.com/office/drawing/2018/hyperlinkcolor" val="tx"/>
+                  </a:ext>
+                </a:extLst>
+              </a:hlinkClick>
+            </a:endParaRPr>
+          </a:p>
+          <a:p>
+            <a:pPr marL="0" marR="0" lvl="0" indent="0" algn="l" defTabSz="914400" rtl="0" eaLnBrk="1" fontAlgn="auto" latinLnBrk="0" hangingPunct="1">
+              <a:lnSpc>
+                <a:spcPct val="100000"/>
+              </a:lnSpc>
+              <a:spcBef>
+                <a:spcPts val="0"/>
+              </a:spcBef>
+              <a:spcAft>
+                <a:spcPts val="0"/>
+              </a:spcAft>
+              <a:buClrTx/>
+              <a:buSzTx/>
+              <a:buFontTx/>
+              <a:buNone/>
+              <a:tabLst/>
+              <a:defRPr/>
+            </a:pPr>
+            <a:endParaRPr lang="en-GB" dirty="0">
+              <a:hlinkClick r:id="rId3">
+                <a:extLst>
+                  <a:ext uri="{A12FA001-AC4F-418D-AE19-62706E023703}">
+                    <ahyp:hlinkClr xmlns:ahyp="http://schemas.microsoft.com/office/drawing/2018/hyperlinkcolor" val="tx"/>
+                  </a:ext>
+                </a:extLst>
+              </a:hlinkClick>
+            </a:endParaRPr>
+          </a:p>
+          <a:p>
+            <a:pPr marL="0" marR="0" lvl="0" indent="0" algn="l" defTabSz="914400" rtl="0" eaLnBrk="1" fontAlgn="auto" latinLnBrk="0" hangingPunct="1">
+              <a:lnSpc>
+                <a:spcPct val="100000"/>
+              </a:lnSpc>
+              <a:spcBef>
+                <a:spcPts val="0"/>
+              </a:spcBef>
+              <a:spcAft>
+                <a:spcPts val="0"/>
+              </a:spcAft>
+              <a:buClrTx/>
+              <a:buSzTx/>
+              <a:buFontTx/>
+              <a:buNone/>
+              <a:tabLst/>
+              <a:defRPr/>
+            </a:pPr>
+            <a:r>
+              <a:rPr lang="en-GB" dirty="0">
+                <a:hlinkClick r:id="rId3">
+                  <a:extLst>
+                    <a:ext uri="{A12FA001-AC4F-418D-AE19-62706E023703}">
+                      <ahyp:hlinkClr xmlns:ahyp="http://schemas.microsoft.com/office/drawing/2018/hyperlinkcolor" val="tx"/>
+                    </a:ext>
+                  </a:extLst>
+                </a:hlinkClick>
+              </a:rPr>
+              <a:t>https://wordpress.org</a:t>
+            </a:r>
+            <a:r>
+              <a:rPr lang="en-GB" dirty="0"/>
+              <a:t> </a:t>
+            </a:r>
+          </a:p>
+          <a:p>
+            <a:pPr marL="0" marR="0" lvl="0" indent="0" algn="l" defTabSz="914400" rtl="0" eaLnBrk="1" fontAlgn="auto" latinLnBrk="0" hangingPunct="1">
+              <a:lnSpc>
+                <a:spcPct val="100000"/>
+              </a:lnSpc>
+              <a:spcBef>
+                <a:spcPts val="0"/>
+              </a:spcBef>
+              <a:spcAft>
+                <a:spcPts val="0"/>
+              </a:spcAft>
+              <a:buClrTx/>
+              <a:buSzTx/>
+              <a:buFontTx/>
+              <a:buNone/>
+              <a:tabLst/>
+              <a:defRPr/>
+            </a:pPr>
+            <a:r>
+              <a:rPr lang="en-GB" dirty="0">
+                <a:hlinkClick r:id="rId4">
+                  <a:extLst>
+                    <a:ext uri="{A12FA001-AC4F-418D-AE19-62706E023703}">
+                      <ahyp:hlinkClr xmlns:ahyp="http://schemas.microsoft.com/office/drawing/2018/hyperlinkcolor" val="tx"/>
+                    </a:ext>
+                  </a:extLst>
+                </a:hlinkClick>
+              </a:rPr>
+              <a:t>https://wordpress.com</a:t>
+            </a:r>
+            <a:r>
+              <a:rPr lang="en-GB" dirty="0"/>
+              <a:t> </a:t>
+            </a:r>
+          </a:p>
+          <a:p>
+            <a:endParaRPr lang="en-GB" dirty="0"/>
+          </a:p>
+          <a:p>
+            <a:endParaRPr lang="en-GB" dirty="0"/>
+          </a:p>
+        </p:txBody>
+      </p:sp>
+      <p:sp>
+        <p:nvSpPr>
+          <p:cNvPr id="4" name="Slide Number Placeholder 3"/>
+          <p:cNvSpPr>
+            <a:spLocks noGrp="1"/>
+          </p:cNvSpPr>
+          <p:nvPr>
+            <p:ph type="sldNum" sz="quarter" idx="5"/>
+          </p:nvPr>
+        </p:nvSpPr>
+        <p:spPr/>
+        <p:txBody>
+          <a:bodyPr/>
+          <a:lstStyle/>
+          <a:p>
+            <a:fld id="{31697867-9353-408E-88A3-61A37A09B962}" type="slidenum">
+              <a:rPr lang="en-GB" smtClean="0"/>
+              <a:t>5</a:t>
+            </a:fld>
+            <a:endParaRPr lang="en-GB"/>
+          </a:p>
+        </p:txBody>
+      </p:sp>
+    </p:spTree>
+    <p:extLst>
+      <p:ext uri="{BB962C8B-B14F-4D97-AF65-F5344CB8AC3E}">
+        <p14:creationId xmlns:p14="http://schemas.microsoft.com/office/powerpoint/2010/main" val="3227457102"/>
+      </p:ext>
+    </p:extLst>
+  </p:cSld>
+  <p:clrMapOvr>
+    <a:masterClrMapping/>
+  </p:clrMapOvr>
+</p:notes>
+</file>
+
+<file path=ppt/notesSlides/notesSlide3.xml><?xml version="1.0" encoding="utf-8"?>
+<p:notes xmlns:a="http://schemas.openxmlformats.org/drawingml/2006/main" xmlns:r="http://schemas.openxmlformats.org/officeDocument/2006/relationships" xmlns:p="http://schemas.openxmlformats.org/presentationml/2006/main">
+  <p:cSld>
+    <p:spTree>
+      <p:nvGrpSpPr>
+        <p:cNvPr id="1" name=""/>
+        <p:cNvGrpSpPr/>
+        <p:nvPr/>
+      </p:nvGrpSpPr>
+      <p:grpSpPr>
+        <a:xfrm>
+          <a:off x="0" y="0"/>
+          <a:ext cx="0" cy="0"/>
+          <a:chOff x="0" y="0"/>
+          <a:chExt cx="0" cy="0"/>
+        </a:xfrm>
+      </p:grpSpPr>
+      <p:sp>
+        <p:nvSpPr>
+          <p:cNvPr id="2" name="Slide Image Placeholder 1"/>
+          <p:cNvSpPr>
+            <a:spLocks noGrp="1" noRot="1" noChangeAspect="1"/>
+          </p:cNvSpPr>
+          <p:nvPr>
+            <p:ph type="sldImg"/>
+          </p:nvPr>
+        </p:nvSpPr>
+        <p:spPr/>
+      </p:sp>
+      <p:sp>
+        <p:nvSpPr>
+          <p:cNvPr id="3" name="Notes Placeholder 2"/>
+          <p:cNvSpPr>
+            <a:spLocks noGrp="1"/>
+          </p:cNvSpPr>
+          <p:nvPr>
+            <p:ph type="body" idx="1"/>
+          </p:nvPr>
+        </p:nvSpPr>
+        <p:spPr/>
+        <p:txBody>
+          <a:bodyPr/>
+          <a:lstStyle/>
+          <a:p>
+            <a:r>
+              <a:rPr lang="en-GB" dirty="0"/>
+              <a:t>Ghost is a hosted </a:t>
+            </a:r>
+            <a:r>
+              <a:rPr lang="en-GB" dirty="0" err="1"/>
+              <a:t>cms</a:t>
+            </a:r>
+            <a:r>
+              <a:rPr lang="en-GB" dirty="0"/>
+              <a:t> platform</a:t>
+            </a:r>
+          </a:p>
+          <a:p>
+            <a:pPr marL="0" marR="0" lvl="0" indent="0" algn="l" defTabSz="914400" rtl="0" eaLnBrk="1" fontAlgn="auto" latinLnBrk="0" hangingPunct="1">
+              <a:lnSpc>
+                <a:spcPct val="100000"/>
+              </a:lnSpc>
+              <a:spcBef>
+                <a:spcPts val="0"/>
+              </a:spcBef>
+              <a:spcAft>
+                <a:spcPts val="0"/>
+              </a:spcAft>
+              <a:buClrTx/>
+              <a:buSzTx/>
+              <a:buFontTx/>
+              <a:buNone/>
+              <a:tabLst/>
+              <a:defRPr/>
+            </a:pPr>
+            <a:r>
+              <a:rPr lang="en-GB" dirty="0"/>
+              <a:t>https://ghost.org/</a:t>
+            </a:r>
+          </a:p>
+          <a:p>
+            <a:endParaRPr lang="en-GB" dirty="0"/>
+          </a:p>
+        </p:txBody>
+      </p:sp>
+      <p:sp>
+        <p:nvSpPr>
+          <p:cNvPr id="4" name="Slide Number Placeholder 3"/>
+          <p:cNvSpPr>
+            <a:spLocks noGrp="1"/>
+          </p:cNvSpPr>
+          <p:nvPr>
+            <p:ph type="sldNum" sz="quarter" idx="5"/>
+          </p:nvPr>
+        </p:nvSpPr>
+        <p:spPr/>
+        <p:txBody>
+          <a:bodyPr/>
+          <a:lstStyle/>
+          <a:p>
+            <a:fld id="{31697867-9353-408E-88A3-61A37A09B962}" type="slidenum">
+              <a:rPr lang="en-GB" smtClean="0"/>
+              <a:t>6</a:t>
+            </a:fld>
+            <a:endParaRPr lang="en-GB"/>
+          </a:p>
+        </p:txBody>
+      </p:sp>
+    </p:spTree>
+    <p:extLst>
+      <p:ext uri="{BB962C8B-B14F-4D97-AF65-F5344CB8AC3E}">
+        <p14:creationId xmlns:p14="http://schemas.microsoft.com/office/powerpoint/2010/main" val="3792867345"/>
+      </p:ext>
+    </p:extLst>
+  </p:cSld>
+  <p:clrMapOvr>
+    <a:masterClrMapping/>
+  </p:clrMapOvr>
+</p:notes>
+</file>
+
+<file path=ppt/notesSlides/notesSlide4.xml><?xml version="1.0" encoding="utf-8"?>
+<p:notes xmlns:a="http://schemas.openxmlformats.org/drawingml/2006/main" xmlns:r="http://schemas.openxmlformats.org/officeDocument/2006/relationships" xmlns:p="http://schemas.openxmlformats.org/presentationml/2006/main">
+  <p:cSld>
+    <p:spTree>
+      <p:nvGrpSpPr>
+        <p:cNvPr id="1" name=""/>
+        <p:cNvGrpSpPr/>
+        <p:nvPr/>
+      </p:nvGrpSpPr>
+      <p:grpSpPr>
+        <a:xfrm>
+          <a:off x="0" y="0"/>
+          <a:ext cx="0" cy="0"/>
+          <a:chOff x="0" y="0"/>
+          <a:chExt cx="0" cy="0"/>
+        </a:xfrm>
+      </p:grpSpPr>
+      <p:sp>
+        <p:nvSpPr>
+          <p:cNvPr id="2" name="Slide Image Placeholder 1"/>
+          <p:cNvSpPr>
+            <a:spLocks noGrp="1" noRot="1" noChangeAspect="1"/>
+          </p:cNvSpPr>
+          <p:nvPr>
+            <p:ph type="sldImg"/>
+          </p:nvPr>
+        </p:nvSpPr>
+        <p:spPr/>
+      </p:sp>
+      <p:sp>
+        <p:nvSpPr>
+          <p:cNvPr id="3" name="Notes Placeholder 2"/>
+          <p:cNvSpPr>
+            <a:spLocks noGrp="1"/>
+          </p:cNvSpPr>
+          <p:nvPr>
+            <p:ph type="body" idx="1"/>
+          </p:nvPr>
+        </p:nvSpPr>
+        <p:spPr/>
+        <p:txBody>
+          <a:bodyPr/>
+          <a:lstStyle/>
+          <a:p>
+            <a:r>
+              <a:rPr lang="en-GB" dirty="0"/>
+              <a:t>Medium is a hosted platform</a:t>
+            </a:r>
+          </a:p>
+          <a:p>
+            <a:r>
+              <a:rPr lang="en-GB" dirty="0"/>
+              <a:t>https://medium.com</a:t>
+            </a:r>
+          </a:p>
+        </p:txBody>
+      </p:sp>
+      <p:sp>
+        <p:nvSpPr>
+          <p:cNvPr id="4" name="Slide Number Placeholder 3"/>
+          <p:cNvSpPr>
+            <a:spLocks noGrp="1"/>
+          </p:cNvSpPr>
+          <p:nvPr>
+            <p:ph type="sldNum" sz="quarter" idx="5"/>
+          </p:nvPr>
+        </p:nvSpPr>
+        <p:spPr/>
+        <p:txBody>
+          <a:bodyPr/>
+          <a:lstStyle/>
+          <a:p>
+            <a:fld id="{31697867-9353-408E-88A3-61A37A09B962}" type="slidenum">
+              <a:rPr lang="en-GB" smtClean="0"/>
+              <a:t>7</a:t>
+            </a:fld>
+            <a:endParaRPr lang="en-GB"/>
+          </a:p>
+        </p:txBody>
+      </p:sp>
+    </p:spTree>
+    <p:extLst>
+      <p:ext uri="{BB962C8B-B14F-4D97-AF65-F5344CB8AC3E}">
+        <p14:creationId xmlns:p14="http://schemas.microsoft.com/office/powerpoint/2010/main" val="3716111187"/>
+      </p:ext>
+    </p:extLst>
+  </p:cSld>
+  <p:clrMapOvr>
+    <a:masterClrMapping/>
+  </p:clrMapOvr>
+</p:notes>
+</file>
+
+<file path=ppt/notesSlides/notesSlide5.xml><?xml version="1.0" encoding="utf-8"?>
+<p:notes xmlns:a="http://schemas.openxmlformats.org/drawingml/2006/main" xmlns:r="http://schemas.openxmlformats.org/officeDocument/2006/relationships" xmlns:p="http://schemas.openxmlformats.org/presentationml/2006/main">
+  <p:cSld>
+    <p:spTree>
+      <p:nvGrpSpPr>
+        <p:cNvPr id="1" name=""/>
+        <p:cNvGrpSpPr/>
+        <p:nvPr/>
+      </p:nvGrpSpPr>
+      <p:grpSpPr>
+        <a:xfrm>
+          <a:off x="0" y="0"/>
+          <a:ext cx="0" cy="0"/>
+          <a:chOff x="0" y="0"/>
+          <a:chExt cx="0" cy="0"/>
+        </a:xfrm>
+      </p:grpSpPr>
+      <p:sp>
+        <p:nvSpPr>
+          <p:cNvPr id="2" name="Slide Image Placeholder 1"/>
+          <p:cNvSpPr>
+            <a:spLocks noGrp="1" noRot="1" noChangeAspect="1"/>
+          </p:cNvSpPr>
+          <p:nvPr>
+            <p:ph type="sldImg"/>
+          </p:nvPr>
+        </p:nvSpPr>
+        <p:spPr/>
+      </p:sp>
+      <p:sp>
+        <p:nvSpPr>
+          <p:cNvPr id="3" name="Notes Placeholder 2"/>
+          <p:cNvSpPr>
+            <a:spLocks noGrp="1"/>
+          </p:cNvSpPr>
+          <p:nvPr>
+            <p:ph type="body" idx="1"/>
+          </p:nvPr>
+        </p:nvSpPr>
+        <p:spPr/>
+        <p:txBody>
+          <a:bodyPr/>
+          <a:lstStyle/>
+          <a:p>
+            <a:r>
+              <a:rPr lang="en-GB" dirty="0"/>
+              <a:t>Hugo is self hosted, You can use GitHub Pages, Netlify or Azure Static WebApp</a:t>
+            </a:r>
+          </a:p>
+          <a:p>
+            <a:pPr marL="0" marR="0" lvl="0" indent="0" algn="l" defTabSz="914400" rtl="0" eaLnBrk="1" fontAlgn="auto" latinLnBrk="0" hangingPunct="1">
+              <a:lnSpc>
+                <a:spcPct val="100000"/>
+              </a:lnSpc>
+              <a:spcBef>
+                <a:spcPts val="0"/>
+              </a:spcBef>
+              <a:spcAft>
+                <a:spcPts val="0"/>
+              </a:spcAft>
+              <a:buClrTx/>
+              <a:buSzTx/>
+              <a:buFontTx/>
+              <a:buNone/>
+              <a:tabLst/>
+              <a:defRPr/>
+            </a:pPr>
+            <a:endParaRPr lang="en-GB" dirty="0"/>
+          </a:p>
+          <a:p>
+            <a:pPr marL="0" marR="0" lvl="0" indent="0" algn="l" defTabSz="914400" rtl="0" eaLnBrk="1" fontAlgn="auto" latinLnBrk="0" hangingPunct="1">
+              <a:lnSpc>
+                <a:spcPct val="100000"/>
+              </a:lnSpc>
+              <a:spcBef>
+                <a:spcPts val="0"/>
+              </a:spcBef>
+              <a:spcAft>
+                <a:spcPts val="0"/>
+              </a:spcAft>
+              <a:buClrTx/>
+              <a:buSzTx/>
+              <a:buFontTx/>
+              <a:buNone/>
+              <a:tabLst/>
+              <a:defRPr/>
+            </a:pPr>
+            <a:r>
+              <a:rPr lang="en-GB" dirty="0"/>
+              <a:t>https://gohugo.io/</a:t>
+            </a:r>
+          </a:p>
+          <a:p>
+            <a:endParaRPr lang="en-GB" dirty="0"/>
+          </a:p>
+        </p:txBody>
+      </p:sp>
+      <p:sp>
+        <p:nvSpPr>
+          <p:cNvPr id="4" name="Slide Number Placeholder 3"/>
+          <p:cNvSpPr>
+            <a:spLocks noGrp="1"/>
+          </p:cNvSpPr>
+          <p:nvPr>
+            <p:ph type="sldNum" sz="quarter" idx="5"/>
+          </p:nvPr>
+        </p:nvSpPr>
+        <p:spPr/>
+        <p:txBody>
+          <a:bodyPr/>
+          <a:lstStyle/>
+          <a:p>
+            <a:fld id="{31697867-9353-408E-88A3-61A37A09B962}" type="slidenum">
+              <a:rPr lang="en-GB" smtClean="0"/>
+              <a:t>8</a:t>
+            </a:fld>
+            <a:endParaRPr lang="en-GB"/>
+          </a:p>
+        </p:txBody>
+      </p:sp>
+    </p:spTree>
+    <p:extLst>
+      <p:ext uri="{BB962C8B-B14F-4D97-AF65-F5344CB8AC3E}">
+        <p14:creationId xmlns:p14="http://schemas.microsoft.com/office/powerpoint/2010/main" val="3923540713"/>
+      </p:ext>
+    </p:extLst>
+  </p:cSld>
+  <p:clrMapOvr>
+    <a:masterClrMapping/>
+  </p:clrMapOvr>
+</p:notes>
+</file>
+
+<file path=ppt/notesSlides/notesSlide6.xml><?xml version="1.0" encoding="utf-8"?>
+<p:notes xmlns:a="http://schemas.openxmlformats.org/drawingml/2006/main" xmlns:r="http://schemas.openxmlformats.org/officeDocument/2006/relationships" xmlns:p="http://schemas.openxmlformats.org/presentationml/2006/main">
+  <p:cSld>
+    <p:spTree>
+      <p:nvGrpSpPr>
+        <p:cNvPr id="1" name=""/>
+        <p:cNvGrpSpPr/>
+        <p:nvPr/>
+      </p:nvGrpSpPr>
+      <p:grpSpPr>
+        <a:xfrm>
+          <a:off x="0" y="0"/>
+          <a:ext cx="0" cy="0"/>
+          <a:chOff x="0" y="0"/>
+          <a:chExt cx="0" cy="0"/>
+        </a:xfrm>
+      </p:grpSpPr>
+      <p:sp>
+        <p:nvSpPr>
+          <p:cNvPr id="2" name="Slide Image Placeholder 1"/>
+          <p:cNvSpPr>
+            <a:spLocks noGrp="1" noRot="1" noChangeAspect="1"/>
+          </p:cNvSpPr>
+          <p:nvPr>
+            <p:ph type="sldImg"/>
+          </p:nvPr>
+        </p:nvSpPr>
+        <p:spPr/>
+      </p:sp>
+      <p:sp>
+        <p:nvSpPr>
+          <p:cNvPr id="3" name="Notes Placeholder 2"/>
+          <p:cNvSpPr>
+            <a:spLocks noGrp="1"/>
+          </p:cNvSpPr>
+          <p:nvPr>
+            <p:ph type="body" idx="1"/>
+          </p:nvPr>
+        </p:nvSpPr>
+        <p:spPr/>
+        <p:txBody>
+          <a:bodyPr/>
+          <a:lstStyle/>
+          <a:p>
+            <a:pPr marL="0" marR="0" lvl="0" indent="0" algn="l" defTabSz="914400" rtl="0" eaLnBrk="1" fontAlgn="auto" latinLnBrk="0" hangingPunct="1">
+              <a:lnSpc>
+                <a:spcPct val="100000"/>
+              </a:lnSpc>
+              <a:spcBef>
+                <a:spcPts val="0"/>
+              </a:spcBef>
+              <a:spcAft>
+                <a:spcPts val="0"/>
+              </a:spcAft>
+              <a:buClrTx/>
+              <a:buSzTx/>
+              <a:buFontTx/>
+              <a:buNone/>
+              <a:tabLst/>
+              <a:defRPr/>
+            </a:pPr>
+            <a:r>
+              <a:rPr lang="en-GB" dirty="0"/>
+              <a:t>Jekyll is self hosted, You can use GitHub Pages, Netlify or Azure Static WebApp</a:t>
+            </a:r>
+          </a:p>
+          <a:p>
+            <a:pPr marL="0" marR="0" lvl="0" indent="0" algn="l" defTabSz="914400" rtl="0" eaLnBrk="1" fontAlgn="auto" latinLnBrk="0" hangingPunct="1">
+              <a:lnSpc>
+                <a:spcPct val="100000"/>
+              </a:lnSpc>
+              <a:spcBef>
+                <a:spcPts val="0"/>
+              </a:spcBef>
+              <a:spcAft>
+                <a:spcPts val="0"/>
+              </a:spcAft>
+              <a:buClrTx/>
+              <a:buSzTx/>
+              <a:buFontTx/>
+              <a:buNone/>
+              <a:tabLst/>
+              <a:defRPr/>
+            </a:pPr>
+            <a:endParaRPr lang="en-GB" dirty="0"/>
+          </a:p>
+          <a:p>
+            <a:pPr marL="0" marR="0" lvl="0" indent="0" algn="l" defTabSz="914400" rtl="0" eaLnBrk="1" fontAlgn="auto" latinLnBrk="0" hangingPunct="1">
+              <a:lnSpc>
+                <a:spcPct val="100000"/>
+              </a:lnSpc>
+              <a:spcBef>
+                <a:spcPts val="0"/>
+              </a:spcBef>
+              <a:spcAft>
+                <a:spcPts val="0"/>
+              </a:spcAft>
+              <a:buClrTx/>
+              <a:buSzTx/>
+              <a:buFontTx/>
+              <a:buNone/>
+              <a:tabLst/>
+              <a:defRPr/>
+            </a:pPr>
+            <a:r>
+              <a:rPr lang="en-GB" dirty="0"/>
+              <a:t>https://jekyllrb.com/</a:t>
+            </a:r>
+          </a:p>
+          <a:p>
+            <a:endParaRPr lang="en-GB" dirty="0"/>
+          </a:p>
+        </p:txBody>
+      </p:sp>
+      <p:sp>
+        <p:nvSpPr>
+          <p:cNvPr id="4" name="Slide Number Placeholder 3"/>
+          <p:cNvSpPr>
+            <a:spLocks noGrp="1"/>
+          </p:cNvSpPr>
+          <p:nvPr>
+            <p:ph type="sldNum" sz="quarter" idx="5"/>
+          </p:nvPr>
+        </p:nvSpPr>
+        <p:spPr/>
+        <p:txBody>
+          <a:bodyPr/>
+          <a:lstStyle/>
+          <a:p>
+            <a:fld id="{31697867-9353-408E-88A3-61A37A09B962}" type="slidenum">
+              <a:rPr lang="en-GB" smtClean="0"/>
+              <a:t>9</a:t>
+            </a:fld>
+            <a:endParaRPr lang="en-GB"/>
+          </a:p>
+        </p:txBody>
+      </p:sp>
+    </p:spTree>
+    <p:extLst>
+      <p:ext uri="{BB962C8B-B14F-4D97-AF65-F5344CB8AC3E}">
+        <p14:creationId xmlns:p14="http://schemas.microsoft.com/office/powerpoint/2010/main" val="2245820777"/>
+      </p:ext>
+    </p:extLst>
+  </p:cSld>
+  <p:clrMapOvr>
+    <a:masterClrMapping/>
+  </p:clrMapOvr>
+</p:notes>
+</file>
+
+<file path=ppt/notesSlides/notesSlide7.xml><?xml version="1.0" encoding="utf-8"?>
+<p:notes xmlns:a="http://schemas.openxmlformats.org/drawingml/2006/main" xmlns:r="http://schemas.openxmlformats.org/officeDocument/2006/relationships" xmlns:p="http://schemas.openxmlformats.org/presentationml/2006/main">
+  <p:cSld>
+    <p:spTree>
+      <p:nvGrpSpPr>
+        <p:cNvPr id="1" name=""/>
+        <p:cNvGrpSpPr/>
+        <p:nvPr/>
+      </p:nvGrpSpPr>
+      <p:grpSpPr>
+        <a:xfrm>
+          <a:off x="0" y="0"/>
+          <a:ext cx="0" cy="0"/>
+          <a:chOff x="0" y="0"/>
+          <a:chExt cx="0" cy="0"/>
+        </a:xfrm>
+      </p:grpSpPr>
+      <p:sp>
+        <p:nvSpPr>
+          <p:cNvPr id="2" name="Slide Image Placeholder 1"/>
+          <p:cNvSpPr>
+            <a:spLocks noGrp="1" noRot="1" noChangeAspect="1"/>
+          </p:cNvSpPr>
+          <p:nvPr>
+            <p:ph type="sldImg"/>
+          </p:nvPr>
+        </p:nvSpPr>
+        <p:spPr/>
+      </p:sp>
+      <p:sp>
+        <p:nvSpPr>
+          <p:cNvPr id="3" name="Notes Placeholder 2"/>
+          <p:cNvSpPr>
+            <a:spLocks noGrp="1"/>
+          </p:cNvSpPr>
+          <p:nvPr>
+            <p:ph type="body" idx="1"/>
+          </p:nvPr>
+        </p:nvSpPr>
+        <p:spPr/>
+        <p:txBody>
+          <a:bodyPr/>
+          <a:lstStyle/>
+          <a:p>
+            <a:r>
+              <a:rPr lang="en-GB" dirty="0"/>
+              <a:t>Machine prep – Install Packages -&gt; Hugo, Git, </a:t>
+            </a:r>
+            <a:r>
+              <a:rPr lang="en-GB" dirty="0" err="1"/>
+              <a:t>VSCode</a:t>
+            </a:r>
+            <a:r>
+              <a:rPr lang="en-GB" dirty="0"/>
+              <a:t>, Pwsh7</a:t>
+            </a:r>
+          </a:p>
+          <a:p>
+            <a:r>
+              <a:rPr lang="en-GB" dirty="0"/>
+              <a:t>Configure Git User and Email</a:t>
+            </a:r>
+          </a:p>
+          <a:p>
+            <a:r>
+              <a:rPr lang="en-GB" dirty="0"/>
+              <a:t>Creating GitHub Repo user-group-</a:t>
+            </a:r>
+            <a:r>
+              <a:rPr lang="en-GB" dirty="0" err="1"/>
+              <a:t>swa</a:t>
+            </a:r>
+            <a:r>
+              <a:rPr lang="en-GB" dirty="0"/>
+              <a:t>-demo</a:t>
+            </a:r>
+          </a:p>
+          <a:p>
+            <a:r>
+              <a:rPr lang="en-GB" dirty="0"/>
+              <a:t>Create Hugo</a:t>
+            </a:r>
+          </a:p>
+          <a:p>
+            <a:r>
+              <a:rPr lang="en-GB" dirty="0"/>
+              <a:t>Clone Repo</a:t>
+            </a:r>
+          </a:p>
+          <a:p>
+            <a:r>
+              <a:rPr lang="en-GB" dirty="0"/>
+              <a:t>Git Init</a:t>
+            </a:r>
+          </a:p>
+          <a:p>
+            <a:r>
+              <a:rPr lang="en-GB" dirty="0"/>
+              <a:t>Install Hugo</a:t>
+            </a:r>
+          </a:p>
+          <a:p>
+            <a:r>
+              <a:rPr lang="en-GB" dirty="0"/>
+              <a:t>Git Commit</a:t>
             </a:r>
           </a:p>
           <a:p>
@@ -625,30 +1433,12 @@
           </a:p>
           <a:p>
             <a:r>
-              <a:rPr lang="en-GB" dirty="0"/>
-              <a:t>Clone Repo</a:t>
-            </a:r>
-          </a:p>
-          <a:p>
-            <a:r>
-              <a:rPr lang="en-GB" dirty="0"/>
-              <a:t>Git Init</a:t>
-            </a:r>
-          </a:p>
-          <a:p>
-            <a:r>
-              <a:rPr lang="en-GB" dirty="0"/>
-              <a:t>Install Hugo</a:t>
-            </a:r>
-          </a:p>
-          <a:p>
-            <a:r>
-              <a:rPr lang="en-GB" dirty="0"/>
-              <a:t>Git Commit</a:t>
-            </a:r>
-          </a:p>
-          <a:p>
-            <a:endParaRPr lang="en-GB" dirty="0"/>
+              <a:rPr lang="en-GB"/>
+              <a:t>Configure Domain and Cert</a:t>
+            </a:r>
+          </a:p>
+          <a:p>
+            <a:endParaRPr lang="en-GB"/>
           </a:p>
           <a:p>
             <a:r>
@@ -661,10 +1451,9 @@
           </a:p>
           <a:p>
             <a:r>
-              <a:rPr lang="en-GB"/>
+              <a:rPr lang="en-GB" dirty="0"/>
               <a:t>https://github.com/smoonlee/public-speaking-slide-decks/tree/main/Getting_Started_With_Blogging</a:t>
             </a:r>
-            <a:endParaRPr lang="en-GB" dirty="0"/>
           </a:p>
         </p:txBody>
       </p:sp>
@@ -704,7 +1493,7 @@
 </p:notes>
 </file>
 
-<file path=ppt/notesSlides/notesSlide3.xml><?xml version="1.0" encoding="utf-8"?>
+<file path=ppt/notesSlides/notesSlide8.xml><?xml version="1.0" encoding="utf-8"?>
 <p:notes xmlns:a="http://schemas.openxmlformats.org/drawingml/2006/main" xmlns:r="http://schemas.openxmlformats.org/officeDocument/2006/relationships" xmlns:p="http://schemas.openxmlformats.org/presentationml/2006/main">
   <p:cSld>
     <p:spTree>
@@ -883,7 +1672,7 @@
           <a:effectLst/>
           <a:extLst>
             <a:ext uri="{91240B29-F687-4f45-9708-019B960494DF}">
-              <a14:hiddenLine xmlns:a14="http://schemas.microsoft.com/office/drawing/2010/main" xmlns="" w="9525">
+              <a14:hiddenLine xmlns="" xmlns:a14="http://schemas.microsoft.com/office/drawing/2010/main" w="9525">
                 <a:solidFill>
                   <a:srgbClr val="000000"/>
                 </a:solidFill>
@@ -1075,7 +1864,7 @@
           <a:p>
             <a:fld id="{8360B236-0FDC-478A-BA6C-F858E3FC5F3C}" type="datetimeFigureOut">
               <a:rPr lang="en-GB" smtClean="0"/>
-              <a:t>14/11/2023</a:t>
+              <a:t>27/11/2023</a:t>
             </a:fld>
             <a:endParaRPr lang="en-GB"/>
           </a:p>
@@ -1393,7 +2182,7 @@
           <a:p>
             <a:fld id="{8360B236-0FDC-478A-BA6C-F858E3FC5F3C}" type="datetimeFigureOut">
               <a:rPr lang="en-GB" smtClean="0"/>
-              <a:t>14/11/2023</a:t>
+              <a:t>27/11/2023</a:t>
             </a:fld>
             <a:endParaRPr lang="en-GB"/>
           </a:p>
@@ -1881,7 +2670,7 @@
           <a:p>
             <a:fld id="{8360B236-0FDC-478A-BA6C-F858E3FC5F3C}" type="datetimeFigureOut">
               <a:rPr lang="en-GB" smtClean="0"/>
-              <a:t>14/11/2023</a:t>
+              <a:t>27/11/2023</a:t>
             </a:fld>
             <a:endParaRPr lang="en-GB"/>
           </a:p>
@@ -2250,7 +3039,7 @@
           <a:p>
             <a:fld id="{8360B236-0FDC-478A-BA6C-F858E3FC5F3C}" type="datetimeFigureOut">
               <a:rPr lang="en-GB" smtClean="0"/>
-              <a:t>14/11/2023</a:t>
+              <a:t>27/11/2023</a:t>
             </a:fld>
             <a:endParaRPr lang="en-GB"/>
           </a:p>
@@ -2405,7 +3194,7 @@
           <a:ln/>
           <a:extLst>
             <a:ext uri="{91240B29-F687-4f45-9708-019B960494DF}">
-              <a14:hiddenLine xmlns:a14="http://schemas.microsoft.com/office/drawing/2010/main" xmlns="" w="9525">
+              <a14:hiddenLine xmlns="" xmlns:a14="http://schemas.microsoft.com/office/drawing/2010/main" w="9525">
                 <a:solidFill>
                   <a:srgbClr val="000000"/>
                 </a:solidFill>
@@ -2523,7 +3312,7 @@
           <a:p>
             <a:fld id="{8360B236-0FDC-478A-BA6C-F858E3FC5F3C}" type="datetimeFigureOut">
               <a:rPr lang="en-GB" smtClean="0"/>
-              <a:t>14/11/2023</a:t>
+              <a:t>27/11/2023</a:t>
             </a:fld>
             <a:endParaRPr lang="en-GB"/>
           </a:p>
@@ -2680,7 +3469,7 @@
           <a:ln/>
           <a:extLst>
             <a:ext uri="{91240B29-F687-4f45-9708-019B960494DF}">
-              <a14:hiddenLine xmlns:a14="http://schemas.microsoft.com/office/drawing/2010/main" xmlns="" w="9525">
+              <a14:hiddenLine xmlns="" xmlns:a14="http://schemas.microsoft.com/office/drawing/2010/main" w="9525">
                 <a:solidFill>
                   <a:srgbClr val="000000"/>
                 </a:solidFill>
@@ -2808,7 +3597,7 @@
           <a:p>
             <a:fld id="{8360B236-0FDC-478A-BA6C-F858E3FC5F3C}" type="datetimeFigureOut">
               <a:rPr lang="en-GB" smtClean="0"/>
-              <a:t>14/11/2023</a:t>
+              <a:t>27/11/2023</a:t>
             </a:fld>
             <a:endParaRPr lang="en-GB"/>
           </a:p>
@@ -2963,7 +3752,7 @@
           <a:ln/>
           <a:extLst>
             <a:ext uri="{91240B29-F687-4f45-9708-019B960494DF}">
-              <a14:hiddenLine xmlns:a14="http://schemas.microsoft.com/office/drawing/2010/main" xmlns="" w="9525">
+              <a14:hiddenLine xmlns="" xmlns:a14="http://schemas.microsoft.com/office/drawing/2010/main" w="9525">
                 <a:solidFill>
                   <a:srgbClr val="000000"/>
                 </a:solidFill>
@@ -3091,7 +3880,7 @@
           <a:p>
             <a:fld id="{8360B236-0FDC-478A-BA6C-F858E3FC5F3C}" type="datetimeFigureOut">
               <a:rPr lang="en-GB" smtClean="0"/>
-              <a:t>14/11/2023</a:t>
+              <a:t>27/11/2023</a:t>
             </a:fld>
             <a:endParaRPr lang="en-GB"/>
           </a:p>
@@ -3434,7 +4223,7 @@
           <a:p>
             <a:fld id="{8360B236-0FDC-478A-BA6C-F858E3FC5F3C}" type="datetimeFigureOut">
               <a:rPr lang="en-GB" smtClean="0"/>
-              <a:t>14/11/2023</a:t>
+              <a:t>27/11/2023</a:t>
             </a:fld>
             <a:endParaRPr lang="en-GB"/>
           </a:p>
@@ -3589,7 +4378,7 @@
           <a:ln/>
           <a:extLst>
             <a:ext uri="{91240B29-F687-4f45-9708-019B960494DF}">
-              <a14:hiddenLine xmlns:a14="http://schemas.microsoft.com/office/drawing/2010/main" xmlns="" w="9525">
+              <a14:hiddenLine xmlns="" xmlns:a14="http://schemas.microsoft.com/office/drawing/2010/main" w="9525">
                 <a:solidFill>
                   <a:srgbClr val="000000"/>
                 </a:solidFill>
@@ -3773,7 +4562,7 @@
           <a:p>
             <a:fld id="{8360B236-0FDC-478A-BA6C-F858E3FC5F3C}" type="datetimeFigureOut">
               <a:rPr lang="en-GB" smtClean="0"/>
-              <a:t>14/11/2023</a:t>
+              <a:t>27/11/2023</a:t>
             </a:fld>
             <a:endParaRPr lang="en-GB"/>
           </a:p>
@@ -3928,7 +4717,7 @@
           <a:ln/>
           <a:extLst>
             <a:ext uri="{91240B29-F687-4f45-9708-019B960494DF}">
-              <a14:hiddenLine xmlns:a14="http://schemas.microsoft.com/office/drawing/2010/main" xmlns="" w="9525">
+              <a14:hiddenLine xmlns="" xmlns:a14="http://schemas.microsoft.com/office/drawing/2010/main" w="9525">
                 <a:solidFill>
                   <a:srgbClr val="000000"/>
                 </a:solidFill>
@@ -4250,7 +5039,7 @@
           <a:p>
             <a:fld id="{8360B236-0FDC-478A-BA6C-F858E3FC5F3C}" type="datetimeFigureOut">
               <a:rPr lang="en-GB" smtClean="0"/>
-              <a:t>14/11/2023</a:t>
+              <a:t>27/11/2023</a:t>
             </a:fld>
             <a:endParaRPr lang="en-GB"/>
           </a:p>
@@ -4405,7 +5194,7 @@
           <a:ln/>
           <a:extLst>
             <a:ext uri="{91240B29-F687-4f45-9708-019B960494DF}">
-              <a14:hiddenLine xmlns:a14="http://schemas.microsoft.com/office/drawing/2010/main" xmlns="" w="9525">
+              <a14:hiddenLine xmlns="" xmlns:a14="http://schemas.microsoft.com/office/drawing/2010/main" w="9525">
                 <a:solidFill>
                   <a:srgbClr val="000000"/>
                 </a:solidFill>
@@ -4471,7 +5260,7 @@
           <a:p>
             <a:fld id="{8360B236-0FDC-478A-BA6C-F858E3FC5F3C}" type="datetimeFigureOut">
               <a:rPr lang="en-GB" smtClean="0"/>
-              <a:t>14/11/2023</a:t>
+              <a:t>27/11/2023</a:t>
             </a:fld>
             <a:endParaRPr lang="en-GB"/>
           </a:p>
@@ -4566,7 +5355,7 @@
           <a:p>
             <a:fld id="{8360B236-0FDC-478A-BA6C-F858E3FC5F3C}" type="datetimeFigureOut">
               <a:rPr lang="en-GB" smtClean="0"/>
-              <a:t>14/11/2023</a:t>
+              <a:t>27/11/2023</a:t>
             </a:fld>
             <a:endParaRPr lang="en-GB"/>
           </a:p>
@@ -4834,7 +5623,7 @@
           <a:ln/>
           <a:extLst>
             <a:ext uri="{91240B29-F687-4f45-9708-019B960494DF}">
-              <a14:hiddenLine xmlns:a14="http://schemas.microsoft.com/office/drawing/2010/main" xmlns="" w="9525">
+              <a14:hiddenLine xmlns="" xmlns:a14="http://schemas.microsoft.com/office/drawing/2010/main" w="9525">
                 <a:solidFill>
                   <a:srgbClr val="000000"/>
                 </a:solidFill>
@@ -5033,7 +5822,7 @@
           <a:p>
             <a:fld id="{8360B236-0FDC-478A-BA6C-F858E3FC5F3C}" type="datetimeFigureOut">
               <a:rPr lang="en-GB" smtClean="0"/>
-              <a:t>14/11/2023</a:t>
+              <a:t>27/11/2023</a:t>
             </a:fld>
             <a:endParaRPr lang="en-GB"/>
           </a:p>
@@ -5346,7 +6135,7 @@
           <a:p>
             <a:fld id="{8360B236-0FDC-478A-BA6C-F858E3FC5F3C}" type="datetimeFigureOut">
               <a:rPr lang="en-GB" smtClean="0"/>
-              <a:t>14/11/2023</a:t>
+              <a:t>27/11/2023</a:t>
             </a:fld>
             <a:endParaRPr lang="en-GB"/>
           </a:p>
@@ -5616,7 +6405,7 @@
           <a:p>
             <a:fld id="{8360B236-0FDC-478A-BA6C-F858E3FC5F3C}" type="datetimeFigureOut">
               <a:rPr lang="en-GB" smtClean="0"/>
-              <a:t>14/11/2023</a:t>
+              <a:t>27/11/2023</a:t>
             </a:fld>
             <a:endParaRPr lang="en-GB"/>
           </a:p>
@@ -6499,7 +7288,7 @@
           <a:ln/>
           <a:extLst>
             <a:ext uri="{91240B29-F687-4f45-9708-019B960494DF}">
-              <a14:hiddenLine xmlns="" xmlns:a14="http://schemas.microsoft.com/office/drawing/2010/main" xmlns:a16="http://schemas.microsoft.com/office/drawing/2014/main" w="9525">
+              <a14:hiddenLine xmlns:a16="http://schemas.microsoft.com/office/drawing/2014/main" xmlns:a14="http://schemas.microsoft.com/office/drawing/2010/main" xmlns="" w="9525">
                 <a:solidFill>
                   <a:srgbClr val="000000"/>
                 </a:solidFill>
@@ -6805,7 +7594,7 @@
           <a:effectLst/>
           <a:extLst>
             <a:ext uri="{91240B29-F687-4f45-9708-019B960494DF}">
-              <a14:hiddenLine xmlns="" xmlns:a16="http://schemas.microsoft.com/office/drawing/2014/main" xmlns:p14="http://schemas.microsoft.com/office/powerpoint/2010/main" xmlns:a14="http://schemas.microsoft.com/office/drawing/2010/main" w="9525">
+              <a14:hiddenLine xmlns:a14="http://schemas.microsoft.com/office/drawing/2010/main" xmlns:p14="http://schemas.microsoft.com/office/powerpoint/2010/main" xmlns:a16="http://schemas.microsoft.com/office/drawing/2014/main" xmlns="" w="9525">
                 <a:solidFill>
                   <a:srgbClr val="000000"/>
                 </a:solidFill>
@@ -7127,7 +7916,7 @@
           <a:effectLst/>
           <a:extLst>
             <a:ext uri="{91240B29-F687-4f45-9708-019B960494DF}">
-              <a14:hiddenLine xmlns="" xmlns:a16="http://schemas.microsoft.com/office/drawing/2014/main" xmlns:p14="http://schemas.microsoft.com/office/powerpoint/2010/main" xmlns:a14="http://schemas.microsoft.com/office/drawing/2010/main" w="9525">
+              <a14:hiddenLine xmlns:a14="http://schemas.microsoft.com/office/drawing/2010/main" xmlns:p14="http://schemas.microsoft.com/office/powerpoint/2010/main" xmlns:a16="http://schemas.microsoft.com/office/drawing/2014/main" xmlns="" w="9525">
                 <a:solidFill>
                   <a:srgbClr val="000000"/>
                 </a:solidFill>
@@ -7690,7 +8479,7 @@
           </p:nvPr>
         </p:nvPicPr>
         <p:blipFill>
-          <a:blip r:embed="rId2">
+          <a:blip r:embed="rId3">
             <a:extLst>
               <a:ext uri="{28A0092B-C50C-407E-A947-70E740481C1C}">
                 <a14:useLocalDpi xmlns:a14="http://schemas.microsoft.com/office/drawing/2010/main" val="0"/>
@@ -7805,7 +8594,7 @@
           <p:nvPr/>
         </p:nvPicPr>
         <p:blipFill>
-          <a:blip r:embed="rId3">
+          <a:blip r:embed="rId4">
             <a:extLst>
               <a:ext uri="{28A0092B-C50C-407E-A947-70E740481C1C}">
                 <a14:useLocalDpi xmlns:a14="http://schemas.microsoft.com/office/drawing/2010/main" val="0"/>
@@ -7841,7 +8630,7 @@
           <p:nvPr/>
         </p:nvPicPr>
         <p:blipFill>
-          <a:blip r:embed="rId4">
+          <a:blip r:embed="rId5">
             <a:extLst>
               <a:ext uri="{28A0092B-C50C-407E-A947-70E740481C1C}">
                 <a14:useLocalDpi xmlns:a14="http://schemas.microsoft.com/office/drawing/2010/main" val="0"/>
@@ -7877,7 +8666,7 @@
           <p:nvPr/>
         </p:nvPicPr>
         <p:blipFill>
-          <a:blip r:embed="rId5">
+          <a:blip r:embed="rId6">
             <a:extLst>
               <a:ext uri="{28A0092B-C50C-407E-A947-70E740481C1C}">
                 <a14:useLocalDpi xmlns:a14="http://schemas.microsoft.com/office/drawing/2010/main" val="0"/>
@@ -8068,7 +8857,7 @@
           <p:nvPr/>
         </p:nvPicPr>
         <p:blipFill>
-          <a:blip r:embed="rId6">
+          <a:blip r:embed="rId7">
             <a:extLst>
               <a:ext uri="{28A0092B-C50C-407E-A947-70E740481C1C}">
                 <a14:useLocalDpi xmlns:a14="http://schemas.microsoft.com/office/drawing/2010/main" val="0"/>
@@ -8255,90 +9044,6 @@
                 <a:cs typeface="+mn-cs"/>
               </a:rPr>
               <a:t>Moved to the Cloud</a:t>
-            </a:r>
-            <a:endParaRPr lang="en-GB"/>
-          </a:p>
-        </p:txBody>
-      </p:sp>
-      <p:pic>
-        <p:nvPicPr>
-          <p:cNvPr id="3" name="Picture 2" descr="A yellow and blue typewriter with a paper&#10;&#10;Description automatically generated">
-            <a:extLst>
-              <a:ext uri="{FF2B5EF4-FFF2-40B4-BE49-F238E27FC236}">
-                <a16:creationId xmlns:a16="http://schemas.microsoft.com/office/drawing/2014/main" id="{3556F794-803B-F9A7-4548-C0E81D7A85E4}"/>
-              </a:ext>
-            </a:extLst>
-          </p:cNvPr>
-          <p:cNvPicPr>
-            <a:picLocks noChangeAspect="1"/>
-          </p:cNvPicPr>
-          <p:nvPr/>
-        </p:nvPicPr>
-        <p:blipFill>
-          <a:blip r:embed="rId5">
-            <a:extLst>
-              <a:ext uri="{28A0092B-C50C-407E-A947-70E740481C1C}">
-                <a14:useLocalDpi xmlns:a14="http://schemas.microsoft.com/office/drawing/2010/main" val="0"/>
-              </a:ext>
-            </a:extLst>
-          </a:blip>
-          <a:stretch>
-            <a:fillRect/>
-          </a:stretch>
-        </p:blipFill>
-        <p:spPr>
-          <a:xfrm>
-            <a:off x="1378085" y="4916184"/>
-            <a:ext cx="490816" cy="490816"/>
-          </a:xfrm>
-          <a:prstGeom prst="rect">
-            <a:avLst/>
-          </a:prstGeom>
-        </p:spPr>
-      </p:pic>
-      <p:sp>
-        <p:nvSpPr>
-          <p:cNvPr id="4" name="TextBox 3">
-            <a:extLst>
-              <a:ext uri="{FF2B5EF4-FFF2-40B4-BE49-F238E27FC236}">
-                <a16:creationId xmlns:a16="http://schemas.microsoft.com/office/drawing/2014/main" id="{3B71FC08-7E9C-7B5C-A0A9-4DDF276A5F50}"/>
-              </a:ext>
-            </a:extLst>
-          </p:cNvPr>
-          <p:cNvSpPr txBox="1"/>
-          <p:nvPr/>
-        </p:nvSpPr>
-        <p:spPr>
-          <a:xfrm>
-            <a:off x="1868901" y="5004712"/>
-            <a:ext cx="3586238" cy="330540"/>
-          </a:xfrm>
-          <a:prstGeom prst="rect">
-            <a:avLst/>
-          </a:prstGeom>
-          <a:noFill/>
-        </p:spPr>
-        <p:txBody>
-          <a:bodyPr wrap="none" rtlCol="0">
-            <a:spAutoFit/>
-          </a:bodyPr>
-          <a:lstStyle/>
-          <a:p>
-            <a:pPr defTabSz="393192">
-              <a:spcAft>
-                <a:spcPts val="600"/>
-              </a:spcAft>
-            </a:pPr>
-            <a:r>
-              <a:rPr lang="en-GB" sz="1548" kern="1200">
-                <a:solidFill>
-                  <a:schemeClr val="tx1"/>
-                </a:solidFill>
-                <a:latin typeface="+mn-lt"/>
-                <a:ea typeface="+mn-ea"/>
-                <a:cs typeface="+mn-cs"/>
-              </a:rPr>
-              <a:t>https://blog.builtwithcaffeine.cloud</a:t>
             </a:r>
             <a:endParaRPr lang="en-GB"/>
           </a:p>
@@ -8621,7 +9326,7 @@
           <a:effectLst/>
           <a:extLst>
             <a:ext uri="{91240B29-F687-4f45-9708-019B960494DF}">
-              <a14:hiddenLine xmlns="" xmlns:a14="http://schemas.microsoft.com/office/drawing/2010/main" xmlns:a16="http://schemas.microsoft.com/office/drawing/2014/main" w="9525">
+              <a14:hiddenLine xmlns:a16="http://schemas.microsoft.com/office/drawing/2014/main" xmlns:a14="http://schemas.microsoft.com/office/drawing/2010/main" xmlns="" w="9525">
                 <a:solidFill>
                   <a:srgbClr val="000000"/>
                 </a:solidFill>
@@ -9059,69 +9764,6 @@
           </a:p>
         </p:txBody>
       </p:sp>
-      <p:sp>
-        <p:nvSpPr>
-          <p:cNvPr id="3" name="TextBox 2">
-            <a:extLst>
-              <a:ext uri="{FF2B5EF4-FFF2-40B4-BE49-F238E27FC236}">
-                <a16:creationId xmlns:a16="http://schemas.microsoft.com/office/drawing/2014/main" id="{8A4B40BC-9780-08D5-F0AA-ED61E5554D6C}"/>
-              </a:ext>
-            </a:extLst>
-          </p:cNvPr>
-          <p:cNvSpPr txBox="1"/>
-          <p:nvPr/>
-        </p:nvSpPr>
-        <p:spPr>
-          <a:xfrm>
-            <a:off x="810000" y="1417638"/>
-            <a:ext cx="5447325" cy="369332"/>
-          </a:xfrm>
-          <a:prstGeom prst="rect">
-            <a:avLst/>
-          </a:prstGeom>
-          <a:noFill/>
-        </p:spPr>
-        <p:txBody>
-          <a:bodyPr wrap="none" rtlCol="0">
-            <a:spAutoFit/>
-          </a:bodyPr>
-          <a:lstStyle/>
-          <a:p>
-            <a:r>
-              <a:rPr lang="en-GB" dirty="0">
-                <a:hlinkClick r:id="rId2">
-                  <a:extLst>
-                    <a:ext uri="{A12FA001-AC4F-418D-AE19-62706E023703}">
-                      <ahyp:hlinkClr xmlns:ahyp="http://schemas.microsoft.com/office/drawing/2018/hyperlinkcolor" val="tx"/>
-                    </a:ext>
-                  </a:extLst>
-                </a:hlinkClick>
-              </a:rPr>
-              <a:t>https://wordpress.org</a:t>
-            </a:r>
-            <a:r>
-              <a:rPr lang="en-GB" dirty="0"/>
-              <a:t> &amp; </a:t>
-            </a:r>
-            <a:r>
-              <a:rPr lang="en-GB" dirty="0">
-                <a:hlinkClick r:id="rId3">
-                  <a:extLst>
-                    <a:ext uri="{A12FA001-AC4F-418D-AE19-62706E023703}">
-                      <ahyp:hlinkClr xmlns:ahyp="http://schemas.microsoft.com/office/drawing/2018/hyperlinkcolor" val="tx"/>
-                    </a:ext>
-                  </a:extLst>
-                </a:hlinkClick>
-              </a:rPr>
-              <a:t>https://wordpress.com</a:t>
-            </a:r>
-            <a:r>
-              <a:rPr lang="en-GB" dirty="0"/>
-              <a:t> </a:t>
-            </a:r>
-          </a:p>
-        </p:txBody>
-      </p:sp>
     </p:spTree>
     <p:extLst>
       <p:ext uri="{BB962C8B-B14F-4D97-AF65-F5344CB8AC3E}">
@@ -9296,41 +9938,6 @@
           </a:p>
         </p:txBody>
       </p:sp>
-      <p:sp>
-        <p:nvSpPr>
-          <p:cNvPr id="4" name="TextBox 3">
-            <a:extLst>
-              <a:ext uri="{FF2B5EF4-FFF2-40B4-BE49-F238E27FC236}">
-                <a16:creationId xmlns:a16="http://schemas.microsoft.com/office/drawing/2014/main" id="{1548BF9A-FDC9-EEF7-6FAC-A9FD50721FBF}"/>
-              </a:ext>
-            </a:extLst>
-          </p:cNvPr>
-          <p:cNvSpPr txBox="1"/>
-          <p:nvPr/>
-        </p:nvSpPr>
-        <p:spPr>
-          <a:xfrm>
-            <a:off x="810000" y="1417638"/>
-            <a:ext cx="2151551" cy="369332"/>
-          </a:xfrm>
-          <a:prstGeom prst="rect">
-            <a:avLst/>
-          </a:prstGeom>
-          <a:noFill/>
-        </p:spPr>
-        <p:txBody>
-          <a:bodyPr wrap="none" rtlCol="0">
-            <a:spAutoFit/>
-          </a:bodyPr>
-          <a:lstStyle/>
-          <a:p>
-            <a:r>
-              <a:rPr lang="en-GB" dirty="0"/>
-              <a:t>https://ghost.org/</a:t>
-            </a:r>
-          </a:p>
-        </p:txBody>
-      </p:sp>
     </p:spTree>
     <p:extLst>
       <p:ext uri="{BB962C8B-B14F-4D97-AF65-F5344CB8AC3E}">
@@ -9519,41 +10126,6 @@
           </a:p>
         </p:txBody>
       </p:sp>
-      <p:sp>
-        <p:nvSpPr>
-          <p:cNvPr id="3" name="TextBox 2">
-            <a:extLst>
-              <a:ext uri="{FF2B5EF4-FFF2-40B4-BE49-F238E27FC236}">
-                <a16:creationId xmlns:a16="http://schemas.microsoft.com/office/drawing/2014/main" id="{F2FC15AD-DD2B-5118-3820-91837EA689B1}"/>
-              </a:ext>
-            </a:extLst>
-          </p:cNvPr>
-          <p:cNvSpPr txBox="1"/>
-          <p:nvPr/>
-        </p:nvSpPr>
-        <p:spPr>
-          <a:xfrm>
-            <a:off x="810000" y="1417638"/>
-            <a:ext cx="2606804" cy="369332"/>
-          </a:xfrm>
-          <a:prstGeom prst="rect">
-            <a:avLst/>
-          </a:prstGeom>
-          <a:noFill/>
-        </p:spPr>
-        <p:txBody>
-          <a:bodyPr wrap="none" rtlCol="0">
-            <a:spAutoFit/>
-          </a:bodyPr>
-          <a:lstStyle/>
-          <a:p>
-            <a:r>
-              <a:rPr lang="en-GB" dirty="0"/>
-              <a:t>https://medium.com/</a:t>
-            </a:r>
-          </a:p>
-        </p:txBody>
-      </p:sp>
     </p:spTree>
     <p:extLst>
       <p:ext uri="{BB962C8B-B14F-4D97-AF65-F5344CB8AC3E}">
@@ -9740,41 +10312,6 @@
           </a:p>
         </p:txBody>
       </p:sp>
-      <p:sp>
-        <p:nvSpPr>
-          <p:cNvPr id="4" name="TextBox 3">
-            <a:extLst>
-              <a:ext uri="{FF2B5EF4-FFF2-40B4-BE49-F238E27FC236}">
-                <a16:creationId xmlns:a16="http://schemas.microsoft.com/office/drawing/2014/main" id="{92346E34-DA4C-2790-3F7B-AC07C0671D41}"/>
-              </a:ext>
-            </a:extLst>
-          </p:cNvPr>
-          <p:cNvSpPr txBox="1"/>
-          <p:nvPr/>
-        </p:nvSpPr>
-        <p:spPr>
-          <a:xfrm>
-            <a:off x="810000" y="1417638"/>
-            <a:ext cx="2252540" cy="369332"/>
-          </a:xfrm>
-          <a:prstGeom prst="rect">
-            <a:avLst/>
-          </a:prstGeom>
-          <a:noFill/>
-        </p:spPr>
-        <p:txBody>
-          <a:bodyPr wrap="none" rtlCol="0">
-            <a:spAutoFit/>
-          </a:bodyPr>
-          <a:lstStyle/>
-          <a:p>
-            <a:r>
-              <a:rPr lang="en-GB" dirty="0"/>
-              <a:t>https://gohugo.io/</a:t>
-            </a:r>
-          </a:p>
-        </p:txBody>
-      </p:sp>
     </p:spTree>
     <p:extLst>
       <p:ext uri="{BB962C8B-B14F-4D97-AF65-F5344CB8AC3E}">
@@ -9972,41 +10509,6 @@
               <a:t>: Jekyll has an active community and a wide range of plugins and themes available, which can extend its functionality.</a:t>
             </a:r>
             <a:endParaRPr lang="en-GB" dirty="0"/>
-          </a:p>
-        </p:txBody>
-      </p:sp>
-      <p:sp>
-        <p:nvSpPr>
-          <p:cNvPr id="4" name="TextBox 3">
-            <a:extLst>
-              <a:ext uri="{FF2B5EF4-FFF2-40B4-BE49-F238E27FC236}">
-                <a16:creationId xmlns:a16="http://schemas.microsoft.com/office/drawing/2014/main" id="{958E540F-DE48-E77E-106D-41ED611C4AEB}"/>
-              </a:ext>
-            </a:extLst>
-          </p:cNvPr>
-          <p:cNvSpPr txBox="1"/>
-          <p:nvPr/>
-        </p:nvSpPr>
-        <p:spPr>
-          <a:xfrm>
-            <a:off x="810000" y="1417638"/>
-            <a:ext cx="2432076" cy="369332"/>
-          </a:xfrm>
-          <a:prstGeom prst="rect">
-            <a:avLst/>
-          </a:prstGeom>
-          <a:noFill/>
-        </p:spPr>
-        <p:txBody>
-          <a:bodyPr wrap="none" rtlCol="0">
-            <a:spAutoFit/>
-          </a:bodyPr>
-          <a:lstStyle/>
-          <a:p>
-            <a:r>
-              <a:rPr lang="en-GB" dirty="0"/>
-              <a:t>https://jekyllrb.com/</a:t>
-            </a:r>
           </a:p>
         </p:txBody>
       </p:sp>

</xml_diff>